<commit_message>
updates for wed lecture
</commit_message>
<xml_diff>
--- a/slides/Online/05 - IntroductionToInterfaces.pptx
+++ b/slides/Online/05 - IntroductionToInterfaces.pptx
@@ -5912,14 +5912,14 @@
   <p:clrMapOvr>
     <a:masterClrMapping/>
   </p:clrMapOvr>
-  <mc:AlternateContent xmlns:mc="http://schemas.openxmlformats.org/markup-compatibility/2006" xmlns:p14="http://schemas.microsoft.com/office/powerpoint/2010/main">
-    <mc:Choice Requires="p14">
-      <p:transition p14:dur="300">
+  <mc:AlternateContent xmlns:mc="http://schemas.openxmlformats.org/markup-compatibility/2006">
+    <mc:Choice xmlns:p14="http://schemas.microsoft.com/office/powerpoint/2010/main" Requires="p14">
+      <p:transition p14:dur="300" advTm="23438">
         <p:fade/>
       </p:transition>
     </mc:Choice>
-    <mc:Fallback xmlns="">
-      <p:transition>
+    <mc:Fallback>
+      <p:transition advTm="23438">
         <p:fade/>
       </p:transition>
     </mc:Fallback>
@@ -6081,14 +6081,14 @@
   <p:clrMapOvr>
     <a:masterClrMapping/>
   </p:clrMapOvr>
-  <mc:AlternateContent xmlns:mc="http://schemas.openxmlformats.org/markup-compatibility/2006" xmlns:p14="http://schemas.microsoft.com/office/powerpoint/2010/main">
-    <mc:Choice Requires="p14">
-      <p:transition p14:dur="300">
+  <mc:AlternateContent xmlns:mc="http://schemas.openxmlformats.org/markup-compatibility/2006">
+    <mc:Choice xmlns:p14="http://schemas.microsoft.com/office/powerpoint/2010/main" Requires="p14">
+      <p:transition p14:dur="300" advTm="77959">
         <p:fade/>
       </p:transition>
     </mc:Choice>
-    <mc:Fallback xmlns="">
-      <p:transition>
+    <mc:Fallback>
+      <p:transition advTm="77959">
         <p:fade/>
       </p:transition>
     </mc:Fallback>
@@ -6618,7 +6618,7 @@
       </p:sp>
       <mc:AlternateContent xmlns:mc="http://schemas.openxmlformats.org/markup-compatibility/2006">
         <mc:Choice xmlns:p14="http://schemas.microsoft.com/office/powerpoint/2010/main" Requires="p14">
-          <p:contentPart p14:bwMode="auto" r:id="rId2">
+          <p:contentPart p14:bwMode="auto" r:id="rId3">
             <p14:nvContentPartPr>
               <p14:cNvPr id="6" name="Ink 5">
                 <a:extLst>
@@ -6650,7 +6650,7 @@
               <p:nvPr/>
             </p:nvPicPr>
             <p:blipFill>
-              <a:blip r:embed="rId3"/>
+              <a:blip r:embed="rId4"/>
               <a:stretch>
                 <a:fillRect/>
               </a:stretch>
@@ -6724,6 +6724,9 @@
         </p:txBody>
       </p:sp>
     </p:spTree>
+    <p:custDataLst>
+      <p:tags r:id="rId1"/>
+    </p:custDataLst>
     <p:extLst>
       <p:ext uri="{BB962C8B-B14F-4D97-AF65-F5344CB8AC3E}">
         <p14:creationId xmlns:p14="http://schemas.microsoft.com/office/powerpoint/2010/main" val="12793564"/>
@@ -6733,14 +6736,14 @@
   <p:clrMapOvr>
     <a:masterClrMapping/>
   </p:clrMapOvr>
-  <mc:AlternateContent xmlns:mc="http://schemas.openxmlformats.org/markup-compatibility/2006" xmlns:p14="http://schemas.microsoft.com/office/powerpoint/2010/main">
-    <mc:Choice Requires="p14">
-      <p:transition p14:dur="300">
+  <mc:AlternateContent xmlns:mc="http://schemas.openxmlformats.org/markup-compatibility/2006">
+    <mc:Choice xmlns:p14="http://schemas.microsoft.com/office/powerpoint/2010/main" Requires="p14">
+      <p:transition p14:dur="300" advTm="73129">
         <p:fade/>
       </p:transition>
     </mc:Choice>
-    <mc:Fallback xmlns="">
-      <p:transition>
+    <mc:Fallback>
+      <p:transition advTm="73129">
         <p:fade/>
       </p:transition>
     </mc:Fallback>
@@ -8345,7 +8348,7 @@
       </p:sp>
       <mc:AlternateContent xmlns:mc="http://schemas.openxmlformats.org/markup-compatibility/2006">
         <mc:Choice xmlns:p14="http://schemas.microsoft.com/office/powerpoint/2010/main" Requires="p14">
-          <p:contentPart p14:bwMode="auto" r:id="rId2">
+          <p:contentPart p14:bwMode="auto" r:id="rId3">
             <p14:nvContentPartPr>
               <p14:cNvPr id="7" name="Ink 6">
                 <a:extLst>
@@ -8377,7 +8380,7 @@
               <p:nvPr/>
             </p:nvPicPr>
             <p:blipFill>
-              <a:blip r:embed="rId3"/>
+              <a:blip r:embed="rId4"/>
               <a:stretch>
                 <a:fillRect/>
               </a:stretch>
@@ -8395,6 +8398,9 @@
         </mc:Fallback>
       </mc:AlternateContent>
     </p:spTree>
+    <p:custDataLst>
+      <p:tags r:id="rId1"/>
+    </p:custDataLst>
     <p:extLst>
       <p:ext uri="{BB962C8B-B14F-4D97-AF65-F5344CB8AC3E}">
         <p14:creationId xmlns:p14="http://schemas.microsoft.com/office/powerpoint/2010/main" val="1464599749"/>
@@ -8404,14 +8410,14 @@
   <p:clrMapOvr>
     <a:masterClrMapping/>
   </p:clrMapOvr>
-  <mc:AlternateContent xmlns:mc="http://schemas.openxmlformats.org/markup-compatibility/2006" xmlns:p14="http://schemas.microsoft.com/office/powerpoint/2010/main">
-    <mc:Choice Requires="p14">
-      <p:transition p14:dur="300">
+  <mc:AlternateContent xmlns:mc="http://schemas.openxmlformats.org/markup-compatibility/2006">
+    <mc:Choice xmlns:p14="http://schemas.microsoft.com/office/powerpoint/2010/main" Requires="p14">
+      <p:transition p14:dur="300" advTm="225110">
         <p:fade/>
       </p:transition>
     </mc:Choice>
-    <mc:Fallback xmlns="">
-      <p:transition>
+    <mc:Fallback>
+      <p:transition advTm="225110">
         <p:fade/>
       </p:transition>
     </mc:Fallback>
@@ -8515,6 +8521,18 @@
     </p:tnLst>
   </p:timing>
 </p:sld>
+</file>
+
+<file path=ppt/tags/tag1.xml><?xml version="1.0" encoding="utf-8"?>
+<p:tagLst xmlns:a="http://schemas.openxmlformats.org/drawingml/2006/main" xmlns:r="http://schemas.openxmlformats.org/officeDocument/2006/relationships" xmlns:p="http://schemas.openxmlformats.org/presentationml/2006/main">
+  <p:tag name="TIMING" val="|26"/>
+</p:tagLst>
+</file>
+
+<file path=ppt/tags/tag2.xml><?xml version="1.0" encoding="utf-8"?>
+<p:tagLst xmlns:a="http://schemas.openxmlformats.org/drawingml/2006/main" xmlns:r="http://schemas.openxmlformats.org/officeDocument/2006/relationships" xmlns:p="http://schemas.openxmlformats.org/presentationml/2006/main">
+  <p:tag name="TIMING" val="|5.1"/>
+</p:tagLst>
 </file>
 
 <file path=ppt/theme/theme1.xml><?xml version="1.0" encoding="utf-8"?>

</xml_diff>